<commit_message>
fix : Week 11 ppt contents
</commit_message>
<xml_diff>
--- a/algorithm/week11/binary_search.pptx
+++ b/algorithm/week11/binary_search.pptx
@@ -5,7 +5,7 @@
     <p:sldMasterId id="2147483648" r:id="rId1"/>
   </p:sldMasterIdLst>
   <p:notesMasterIdLst>
-    <p:notesMasterId r:id="rId12"/>
+    <p:notesMasterId r:id="rId13"/>
   </p:notesMasterIdLst>
   <p:sldIdLst>
     <p:sldId id="256" r:id="rId2"/>
@@ -14,10 +14,11 @@
     <p:sldId id="263" r:id="rId5"/>
     <p:sldId id="260" r:id="rId6"/>
     <p:sldId id="271" r:id="rId7"/>
-    <p:sldId id="261" r:id="rId8"/>
-    <p:sldId id="264" r:id="rId9"/>
-    <p:sldId id="272" r:id="rId10"/>
-    <p:sldId id="270" r:id="rId11"/>
+    <p:sldId id="273" r:id="rId8"/>
+    <p:sldId id="261" r:id="rId9"/>
+    <p:sldId id="264" r:id="rId10"/>
+    <p:sldId id="272" r:id="rId11"/>
+    <p:sldId id="270" r:id="rId12"/>
   </p:sldIdLst>
   <p:sldSz cx="12192000" cy="6858000"/>
   <p:notesSz cx="6858000" cy="9144000"/>
@@ -718,7 +719,7 @@
           <a:p>
             <a:fld id="{463075E1-6247-4129-A917-CB5C8FC7180A}" type="slidenum">
               <a:rPr lang="ko-KR" altLang="en-US" smtClean="0"/>
-              <a:t>8</a:t>
+              <a:t>7</a:t>
             </a:fld>
             <a:endParaRPr lang="ko-KR" altLang="en-US"/>
           </a:p>
@@ -727,7 +728,7 @@
     </p:spTree>
     <p:extLst>
       <p:ext uri="{BB962C8B-B14F-4D97-AF65-F5344CB8AC3E}">
-        <p14:creationId xmlns:p14="http://schemas.microsoft.com/office/powerpoint/2010/main" val="2833563409"/>
+        <p14:creationId xmlns:p14="http://schemas.microsoft.com/office/powerpoint/2010/main" val="52797388"/>
       </p:ext>
     </p:extLst>
   </p:cSld>
@@ -811,7 +812,7 @@
     </p:spTree>
     <p:extLst>
       <p:ext uri="{BB962C8B-B14F-4D97-AF65-F5344CB8AC3E}">
-        <p14:creationId xmlns:p14="http://schemas.microsoft.com/office/powerpoint/2010/main" val="1470817765"/>
+        <p14:creationId xmlns:p14="http://schemas.microsoft.com/office/powerpoint/2010/main" val="2833563409"/>
       </p:ext>
     </p:extLst>
   </p:cSld>
@@ -865,7 +866,7 @@
           <a:bodyPr/>
           <a:lstStyle/>
           <a:p>
-            <a:endParaRPr lang="ko-KR" altLang="en-US"/>
+            <a:endParaRPr lang="ko-KR" altLang="en-US" dirty="0"/>
           </a:p>
         </p:txBody>
       </p:sp>
@@ -887,6 +888,90 @@
             <a:fld id="{463075E1-6247-4129-A917-CB5C8FC7180A}" type="slidenum">
               <a:rPr lang="ko-KR" altLang="en-US" smtClean="0"/>
               <a:t>10</a:t>
+            </a:fld>
+            <a:endParaRPr lang="ko-KR" altLang="en-US"/>
+          </a:p>
+        </p:txBody>
+      </p:sp>
+    </p:spTree>
+    <p:extLst>
+      <p:ext uri="{BB962C8B-B14F-4D97-AF65-F5344CB8AC3E}">
+        <p14:creationId xmlns:p14="http://schemas.microsoft.com/office/powerpoint/2010/main" val="1470817765"/>
+      </p:ext>
+    </p:extLst>
+  </p:cSld>
+  <p:clrMapOvr>
+    <a:masterClrMapping/>
+  </p:clrMapOvr>
+</p:notes>
+</file>
+
+<file path=ppt/notesSlides/notesSlide6.xml><?xml version="1.0" encoding="utf-8"?>
+<p:notes xmlns:a="http://schemas.openxmlformats.org/drawingml/2006/main" xmlns:r="http://schemas.openxmlformats.org/officeDocument/2006/relationships" xmlns:p="http://schemas.openxmlformats.org/presentationml/2006/main">
+  <p:cSld>
+    <p:spTree>
+      <p:nvGrpSpPr>
+        <p:cNvPr id="1" name=""/>
+        <p:cNvGrpSpPr/>
+        <p:nvPr/>
+      </p:nvGrpSpPr>
+      <p:grpSpPr>
+        <a:xfrm>
+          <a:off x="0" y="0"/>
+          <a:ext cx="0" cy="0"/>
+          <a:chOff x="0" y="0"/>
+          <a:chExt cx="0" cy="0"/>
+        </a:xfrm>
+      </p:grpSpPr>
+      <p:sp>
+        <p:nvSpPr>
+          <p:cNvPr id="2" name="슬라이드 이미지 개체 틀 1"/>
+          <p:cNvSpPr>
+            <a:spLocks noGrp="1" noRot="1" noChangeAspect="1"/>
+          </p:cNvSpPr>
+          <p:nvPr>
+            <p:ph type="sldImg"/>
+          </p:nvPr>
+        </p:nvSpPr>
+        <p:spPr/>
+      </p:sp>
+      <p:sp>
+        <p:nvSpPr>
+          <p:cNvPr id="3" name="슬라이드 노트 개체 틀 2"/>
+          <p:cNvSpPr>
+            <a:spLocks noGrp="1"/>
+          </p:cNvSpPr>
+          <p:nvPr>
+            <p:ph type="body" idx="1"/>
+          </p:nvPr>
+        </p:nvSpPr>
+        <p:spPr/>
+        <p:txBody>
+          <a:bodyPr/>
+          <a:lstStyle/>
+          <a:p>
+            <a:endParaRPr lang="ko-KR" altLang="en-US"/>
+          </a:p>
+        </p:txBody>
+      </p:sp>
+      <p:sp>
+        <p:nvSpPr>
+          <p:cNvPr id="4" name="슬라이드 번호 개체 틀 3"/>
+          <p:cNvSpPr>
+            <a:spLocks noGrp="1"/>
+          </p:cNvSpPr>
+          <p:nvPr>
+            <p:ph type="sldNum" sz="quarter" idx="5"/>
+          </p:nvPr>
+        </p:nvSpPr>
+        <p:spPr/>
+        <p:txBody>
+          <a:bodyPr/>
+          <a:lstStyle/>
+          <a:p>
+            <a:fld id="{463075E1-6247-4129-A917-CB5C8FC7180A}" type="slidenum">
+              <a:rPr lang="ko-KR" altLang="en-US" smtClean="0"/>
+              <a:t>11</a:t>
             </a:fld>
             <a:endParaRPr lang="ko-KR" altLang="en-US"/>
           </a:p>
@@ -4501,6 +4586,380 @@
       </p:grpSpPr>
       <p:sp>
         <p:nvSpPr>
+          <p:cNvPr id="3" name="부제목 2">
+            <a:extLst>
+              <a:ext uri="{FF2B5EF4-FFF2-40B4-BE49-F238E27FC236}">
+                <a16:creationId xmlns:a16="http://schemas.microsoft.com/office/drawing/2014/main" id="{96600BBD-05AC-4ACF-8F29-4FCAF81B1CC8}"/>
+              </a:ext>
+            </a:extLst>
+          </p:cNvPr>
+          <p:cNvSpPr>
+            <a:spLocks noGrp="1"/>
+          </p:cNvSpPr>
+          <p:nvPr>
+            <p:ph type="subTitle" idx="1"/>
+          </p:nvPr>
+        </p:nvSpPr>
+        <p:spPr>
+          <a:xfrm>
+            <a:off x="1524000" y="1399823"/>
+            <a:ext cx="9144000" cy="3714044"/>
+          </a:xfrm>
+        </p:spPr>
+        <p:txBody>
+          <a:bodyPr>
+            <a:normAutofit/>
+          </a:bodyPr>
+          <a:lstStyle/>
+          <a:p>
+            <a:endParaRPr lang="en-US" altLang="ko-KR" sz="3600" dirty="0">
+              <a:solidFill>
+                <a:schemeClr val="bg1">
+                  <a:lumMod val="95000"/>
+                </a:schemeClr>
+              </a:solidFill>
+            </a:endParaRPr>
+          </a:p>
+          <a:p>
+            <a:r>
+              <a:rPr lang="ko-KR" altLang="en-US" sz="4300" dirty="0">
+                <a:solidFill>
+                  <a:schemeClr val="bg1">
+                    <a:lumMod val="95000"/>
+                  </a:schemeClr>
+                </a:solidFill>
+              </a:rPr>
+              <a:t>이분 탐색을 사용한 이유</a:t>
+            </a:r>
+            <a:endParaRPr lang="en-US" altLang="ko-KR" sz="4300" dirty="0">
+              <a:solidFill>
+                <a:schemeClr val="bg1">
+                  <a:lumMod val="95000"/>
+                </a:schemeClr>
+              </a:solidFill>
+            </a:endParaRPr>
+          </a:p>
+          <a:p>
+            <a:endParaRPr lang="en-US" altLang="ko-KR" sz="3600" dirty="0">
+              <a:solidFill>
+                <a:schemeClr val="bg1">
+                  <a:lumMod val="95000"/>
+                </a:schemeClr>
+              </a:solidFill>
+            </a:endParaRPr>
+          </a:p>
+          <a:p>
+            <a:pPr marL="742950" indent="-742950" algn="l">
+              <a:buAutoNum type="arabicPeriod"/>
+            </a:pPr>
+            <a:r>
+              <a:rPr lang="ko-KR" altLang="en-US" sz="3600" dirty="0">
+                <a:solidFill>
+                  <a:schemeClr val="bg1">
+                    <a:lumMod val="95000"/>
+                  </a:schemeClr>
+                </a:solidFill>
+              </a:rPr>
+              <a:t>탐색 범위가 큼</a:t>
+            </a:r>
+            <a:endParaRPr lang="en-US" altLang="ko-KR" sz="3600" dirty="0">
+              <a:solidFill>
+                <a:schemeClr val="bg1">
+                  <a:lumMod val="95000"/>
+                </a:schemeClr>
+              </a:solidFill>
+            </a:endParaRPr>
+          </a:p>
+          <a:p>
+            <a:pPr marL="742950" indent="-742950" algn="l">
+              <a:buAutoNum type="arabicPeriod"/>
+            </a:pPr>
+            <a:r>
+              <a:rPr lang="ko-KR" altLang="en-US" sz="3600" dirty="0">
+                <a:solidFill>
+                  <a:schemeClr val="bg1">
+                    <a:lumMod val="95000"/>
+                  </a:schemeClr>
+                </a:solidFill>
+              </a:rPr>
+              <a:t>찾고자 하는 값이 정렬되어 있음</a:t>
+            </a:r>
+            <a:endParaRPr lang="en-US" altLang="ko-KR" sz="3600" dirty="0">
+              <a:solidFill>
+                <a:schemeClr val="bg1">
+                  <a:lumMod val="95000"/>
+                </a:schemeClr>
+              </a:solidFill>
+            </a:endParaRPr>
+          </a:p>
+        </p:txBody>
+      </p:sp>
+      <p:sp>
+        <p:nvSpPr>
+          <p:cNvPr id="4" name="부제목 2">
+            <a:extLst>
+              <a:ext uri="{FF2B5EF4-FFF2-40B4-BE49-F238E27FC236}">
+                <a16:creationId xmlns:a16="http://schemas.microsoft.com/office/drawing/2014/main" id="{0B611E32-700E-49F9-8B5C-75F8377B8F55}"/>
+              </a:ext>
+            </a:extLst>
+          </p:cNvPr>
+          <p:cNvSpPr txBox="1">
+            <a:spLocks/>
+          </p:cNvSpPr>
+          <p:nvPr/>
+        </p:nvSpPr>
+        <p:spPr>
+          <a:xfrm>
+            <a:off x="130628" y="160773"/>
+            <a:ext cx="1728317" cy="391886"/>
+          </a:xfrm>
+          <a:prstGeom prst="rect">
+            <a:avLst/>
+          </a:prstGeom>
+        </p:spPr>
+        <p:txBody>
+          <a:bodyPr vert="horz" lIns="91440" tIns="45720" rIns="91440" bIns="45720" rtlCol="0">
+            <a:normAutofit lnSpcReduction="10000"/>
+          </a:bodyPr>
+          <a:lstStyle>
+            <a:lvl1pPr marL="0" indent="0" algn="ctr" defTabSz="914400" rtl="0" eaLnBrk="1" latinLnBrk="1" hangingPunct="1">
+              <a:lnSpc>
+                <a:spcPct val="90000"/>
+              </a:lnSpc>
+              <a:spcBef>
+                <a:spcPts val="1000"/>
+              </a:spcBef>
+              <a:buFont typeface="Arial" panose="020B0604020202020204" pitchFamily="34" charset="0"/>
+              <a:buNone/>
+              <a:defRPr sz="2400" kern="1200">
+                <a:solidFill>
+                  <a:schemeClr val="tx1"/>
+                </a:solidFill>
+                <a:latin typeface="+mn-lt"/>
+                <a:ea typeface="+mn-ea"/>
+                <a:cs typeface="+mn-cs"/>
+              </a:defRPr>
+            </a:lvl1pPr>
+            <a:lvl2pPr marL="457200" indent="0" algn="ctr" defTabSz="914400" rtl="0" eaLnBrk="1" latinLnBrk="1" hangingPunct="1">
+              <a:lnSpc>
+                <a:spcPct val="90000"/>
+              </a:lnSpc>
+              <a:spcBef>
+                <a:spcPts val="500"/>
+              </a:spcBef>
+              <a:buFont typeface="Arial" panose="020B0604020202020204" pitchFamily="34" charset="0"/>
+              <a:buNone/>
+              <a:defRPr sz="2000" kern="1200">
+                <a:solidFill>
+                  <a:schemeClr val="tx1"/>
+                </a:solidFill>
+                <a:latin typeface="+mn-lt"/>
+                <a:ea typeface="+mn-ea"/>
+                <a:cs typeface="+mn-cs"/>
+              </a:defRPr>
+            </a:lvl2pPr>
+            <a:lvl3pPr marL="914400" indent="0" algn="ctr" defTabSz="914400" rtl="0" eaLnBrk="1" latinLnBrk="1" hangingPunct="1">
+              <a:lnSpc>
+                <a:spcPct val="90000"/>
+              </a:lnSpc>
+              <a:spcBef>
+                <a:spcPts val="500"/>
+              </a:spcBef>
+              <a:buFont typeface="Arial" panose="020B0604020202020204" pitchFamily="34" charset="0"/>
+              <a:buNone/>
+              <a:defRPr sz="1800" kern="1200">
+                <a:solidFill>
+                  <a:schemeClr val="tx1"/>
+                </a:solidFill>
+                <a:latin typeface="+mn-lt"/>
+                <a:ea typeface="+mn-ea"/>
+                <a:cs typeface="+mn-cs"/>
+              </a:defRPr>
+            </a:lvl3pPr>
+            <a:lvl4pPr marL="1371600" indent="0" algn="ctr" defTabSz="914400" rtl="0" eaLnBrk="1" latinLnBrk="1" hangingPunct="1">
+              <a:lnSpc>
+                <a:spcPct val="90000"/>
+              </a:lnSpc>
+              <a:spcBef>
+                <a:spcPts val="500"/>
+              </a:spcBef>
+              <a:buFont typeface="Arial" panose="020B0604020202020204" pitchFamily="34" charset="0"/>
+              <a:buNone/>
+              <a:defRPr sz="1600" kern="1200">
+                <a:solidFill>
+                  <a:schemeClr val="tx1"/>
+                </a:solidFill>
+                <a:latin typeface="+mn-lt"/>
+                <a:ea typeface="+mn-ea"/>
+                <a:cs typeface="+mn-cs"/>
+              </a:defRPr>
+            </a:lvl4pPr>
+            <a:lvl5pPr marL="1828800" indent="0" algn="ctr" defTabSz="914400" rtl="0" eaLnBrk="1" latinLnBrk="1" hangingPunct="1">
+              <a:lnSpc>
+                <a:spcPct val="90000"/>
+              </a:lnSpc>
+              <a:spcBef>
+                <a:spcPts val="500"/>
+              </a:spcBef>
+              <a:buFont typeface="Arial" panose="020B0604020202020204" pitchFamily="34" charset="0"/>
+              <a:buNone/>
+              <a:defRPr sz="1600" kern="1200">
+                <a:solidFill>
+                  <a:schemeClr val="tx1"/>
+                </a:solidFill>
+                <a:latin typeface="+mn-lt"/>
+                <a:ea typeface="+mn-ea"/>
+                <a:cs typeface="+mn-cs"/>
+              </a:defRPr>
+            </a:lvl5pPr>
+            <a:lvl6pPr marL="2286000" indent="0" algn="ctr" defTabSz="914400" rtl="0" eaLnBrk="1" latinLnBrk="1" hangingPunct="1">
+              <a:lnSpc>
+                <a:spcPct val="90000"/>
+              </a:lnSpc>
+              <a:spcBef>
+                <a:spcPts val="500"/>
+              </a:spcBef>
+              <a:buFont typeface="Arial" panose="020B0604020202020204" pitchFamily="34" charset="0"/>
+              <a:buNone/>
+              <a:defRPr sz="1600" kern="1200">
+                <a:solidFill>
+                  <a:schemeClr val="tx1"/>
+                </a:solidFill>
+                <a:latin typeface="+mn-lt"/>
+                <a:ea typeface="+mn-ea"/>
+                <a:cs typeface="+mn-cs"/>
+              </a:defRPr>
+            </a:lvl6pPr>
+            <a:lvl7pPr marL="2743200" indent="0" algn="ctr" defTabSz="914400" rtl="0" eaLnBrk="1" latinLnBrk="1" hangingPunct="1">
+              <a:lnSpc>
+                <a:spcPct val="90000"/>
+              </a:lnSpc>
+              <a:spcBef>
+                <a:spcPts val="500"/>
+              </a:spcBef>
+              <a:buFont typeface="Arial" panose="020B0604020202020204" pitchFamily="34" charset="0"/>
+              <a:buNone/>
+              <a:defRPr sz="1600" kern="1200">
+                <a:solidFill>
+                  <a:schemeClr val="tx1"/>
+                </a:solidFill>
+                <a:latin typeface="+mn-lt"/>
+                <a:ea typeface="+mn-ea"/>
+                <a:cs typeface="+mn-cs"/>
+              </a:defRPr>
+            </a:lvl7pPr>
+            <a:lvl8pPr marL="3200400" indent="0" algn="ctr" defTabSz="914400" rtl="0" eaLnBrk="1" latinLnBrk="1" hangingPunct="1">
+              <a:lnSpc>
+                <a:spcPct val="90000"/>
+              </a:lnSpc>
+              <a:spcBef>
+                <a:spcPts val="500"/>
+              </a:spcBef>
+              <a:buFont typeface="Arial" panose="020B0604020202020204" pitchFamily="34" charset="0"/>
+              <a:buNone/>
+              <a:defRPr sz="1600" kern="1200">
+                <a:solidFill>
+                  <a:schemeClr val="tx1"/>
+                </a:solidFill>
+                <a:latin typeface="+mn-lt"/>
+                <a:ea typeface="+mn-ea"/>
+                <a:cs typeface="+mn-cs"/>
+              </a:defRPr>
+            </a:lvl8pPr>
+            <a:lvl9pPr marL="3657600" indent="0" algn="ctr" defTabSz="914400" rtl="0" eaLnBrk="1" latinLnBrk="1" hangingPunct="1">
+              <a:lnSpc>
+                <a:spcPct val="90000"/>
+              </a:lnSpc>
+              <a:spcBef>
+                <a:spcPts val="500"/>
+              </a:spcBef>
+              <a:buFont typeface="Arial" panose="020B0604020202020204" pitchFamily="34" charset="0"/>
+              <a:buNone/>
+              <a:defRPr sz="1600" kern="1200">
+                <a:solidFill>
+                  <a:schemeClr val="tx1"/>
+                </a:solidFill>
+                <a:latin typeface="+mn-lt"/>
+                <a:ea typeface="+mn-ea"/>
+                <a:cs typeface="+mn-cs"/>
+              </a:defRPr>
+            </a:lvl9pPr>
+          </a:lstStyle>
+          <a:p>
+            <a:pPr algn="l"/>
+            <a:r>
+              <a:rPr lang="en-US" altLang="ko-KR" dirty="0">
+                <a:solidFill>
+                  <a:schemeClr val="bg1">
+                    <a:lumMod val="95000"/>
+                  </a:schemeClr>
+                </a:solidFill>
+              </a:rPr>
+              <a:t>2. </a:t>
+            </a:r>
+            <a:r>
+              <a:rPr lang="ko-KR" altLang="en-US" dirty="0">
+                <a:solidFill>
+                  <a:schemeClr val="bg1">
+                    <a:lumMod val="95000"/>
+                  </a:schemeClr>
+                </a:solidFill>
+              </a:rPr>
+              <a:t>실습</a:t>
+            </a:r>
+            <a:endParaRPr lang="en-US" altLang="ko-KR" dirty="0">
+              <a:solidFill>
+                <a:schemeClr val="bg1">
+                  <a:lumMod val="95000"/>
+                </a:schemeClr>
+              </a:solidFill>
+            </a:endParaRPr>
+          </a:p>
+        </p:txBody>
+      </p:sp>
+    </p:spTree>
+    <p:extLst>
+      <p:ext uri="{BB962C8B-B14F-4D97-AF65-F5344CB8AC3E}">
+        <p14:creationId xmlns:p14="http://schemas.microsoft.com/office/powerpoint/2010/main" val="4040610195"/>
+      </p:ext>
+    </p:extLst>
+  </p:cSld>
+  <p:clrMapOvr>
+    <a:masterClrMapping/>
+  </p:clrMapOvr>
+</p:sld>
+</file>
+
+<file path=ppt/slides/slide11.xml><?xml version="1.0" encoding="utf-8"?>
+<p:sld xmlns:a="http://schemas.openxmlformats.org/drawingml/2006/main" xmlns:r="http://schemas.openxmlformats.org/officeDocument/2006/relationships" xmlns:p="http://schemas.openxmlformats.org/presentationml/2006/main">
+  <p:cSld>
+    <p:bg>
+      <p:bgPr>
+        <a:solidFill>
+          <a:schemeClr val="tx1">
+            <a:lumMod val="85000"/>
+            <a:lumOff val="15000"/>
+          </a:schemeClr>
+        </a:solidFill>
+        <a:effectLst/>
+      </p:bgPr>
+    </p:bg>
+    <p:spTree>
+      <p:nvGrpSpPr>
+        <p:cNvPr id="1" name=""/>
+        <p:cNvGrpSpPr/>
+        <p:nvPr/>
+      </p:nvGrpSpPr>
+      <p:grpSpPr>
+        <a:xfrm>
+          <a:off x="0" y="0"/>
+          <a:ext cx="0" cy="0"/>
+          <a:chOff x="0" y="0"/>
+          <a:chExt cx="0" cy="0"/>
+        </a:xfrm>
+      </p:grpSpPr>
+      <p:sp>
+        <p:nvSpPr>
           <p:cNvPr id="9" name="부제목 2">
             <a:extLst>
               <a:ext uri="{FF2B5EF4-FFF2-40B4-BE49-F238E27FC236}">
@@ -6601,8 +7060,8 @@
         </p:nvSpPr>
         <p:spPr>
           <a:xfrm>
-            <a:off x="1524000" y="1885245"/>
-            <a:ext cx="9144000" cy="2585155"/>
+            <a:off x="55389" y="5909237"/>
+            <a:ext cx="1878794" cy="926185"/>
           </a:xfrm>
         </p:spPr>
         <p:txBody>
@@ -6611,52 +7070,20 @@
           </a:bodyPr>
           <a:lstStyle/>
           <a:p>
-            <a:endParaRPr lang="en-US" altLang="ko-KR" sz="3600" dirty="0">
-              <a:solidFill>
-                <a:schemeClr val="bg1">
-                  <a:lumMod val="95000"/>
-                </a:schemeClr>
-              </a:solidFill>
-            </a:endParaRPr>
-          </a:p>
-          <a:p>
-            <a:r>
-              <a:rPr lang="ko-KR" altLang="en-US" sz="3600" dirty="0">
+            <a:pPr algn="l">
+              <a:lnSpc>
+                <a:spcPct val="100000"/>
+              </a:lnSpc>
+            </a:pPr>
+            <a:r>
+              <a:rPr lang="en-US" altLang="ko-KR" sz="4400" dirty="0">
                 <a:solidFill>
                   <a:schemeClr val="bg1">
-                    <a:lumMod val="95000"/>
+                    <a:lumMod val="65000"/>
                   </a:schemeClr>
                 </a:solidFill>
               </a:rPr>
-              <a:t>🌲나무 자르기</a:t>
-            </a:r>
-            <a:endParaRPr lang="en-US" altLang="ko-KR" sz="3600" dirty="0">
-              <a:solidFill>
-                <a:schemeClr val="bg1">
-                  <a:lumMod val="95000"/>
-                </a:schemeClr>
-              </a:solidFill>
-            </a:endParaRPr>
-          </a:p>
-          <a:p>
-            <a:endParaRPr lang="en-US" altLang="ko-KR" sz="3600" dirty="0">
-              <a:solidFill>
-                <a:schemeClr val="bg1">
-                  <a:lumMod val="95000"/>
-                </a:schemeClr>
-              </a:solidFill>
-            </a:endParaRPr>
-          </a:p>
-          <a:p>
-            <a:r>
-              <a:rPr lang="en-US" altLang="ko-KR" sz="3600" dirty="0">
-                <a:solidFill>
-                  <a:schemeClr val="bg1">
-                    <a:lumMod val="95000"/>
-                  </a:schemeClr>
-                </a:solidFill>
-              </a:rPr>
-              <a:t>https://www.acmicpc.net/problem/2805</a:t>
+              <a:t>Cons</a:t>
             </a:r>
           </a:p>
         </p:txBody>
@@ -6862,7 +7289,7 @@
                   </a:schemeClr>
                 </a:solidFill>
               </a:rPr>
-              <a:t>2. </a:t>
+              <a:t>1. </a:t>
             </a:r>
             <a:r>
               <a:rPr lang="ko-KR" altLang="en-US" dirty="0">
@@ -6872,7 +7299,7 @@
                   </a:schemeClr>
                 </a:solidFill>
               </a:rPr>
-              <a:t>실습</a:t>
+              <a:t>개요</a:t>
             </a:r>
             <a:endParaRPr lang="en-US" altLang="ko-KR" dirty="0">
               <a:solidFill>
@@ -6884,10 +7311,352 @@
           </a:p>
         </p:txBody>
       </p:sp>
+      <p:sp>
+        <p:nvSpPr>
+          <p:cNvPr id="7" name="부제목 2">
+            <a:extLst>
+              <a:ext uri="{FF2B5EF4-FFF2-40B4-BE49-F238E27FC236}">
+                <a16:creationId xmlns:a16="http://schemas.microsoft.com/office/drawing/2014/main" id="{B7DB678D-3B73-42ED-8DB9-BE5E67F1E786}"/>
+              </a:ext>
+            </a:extLst>
+          </p:cNvPr>
+          <p:cNvSpPr txBox="1">
+            <a:spLocks/>
+          </p:cNvSpPr>
+          <p:nvPr/>
+        </p:nvSpPr>
+        <p:spPr>
+          <a:xfrm>
+            <a:off x="863600" y="2059322"/>
+            <a:ext cx="10464800" cy="3675034"/>
+          </a:xfrm>
+          <a:prstGeom prst="rect">
+            <a:avLst/>
+          </a:prstGeom>
+        </p:spPr>
+        <p:txBody>
+          <a:bodyPr vert="horz" lIns="91440" tIns="45720" rIns="91440" bIns="45720" rtlCol="0">
+            <a:normAutofit fontScale="92500" lnSpcReduction="10000"/>
+          </a:bodyPr>
+          <a:lstStyle>
+            <a:lvl1pPr marL="0" indent="0" algn="ctr" defTabSz="914400" rtl="0" eaLnBrk="1" latinLnBrk="1" hangingPunct="1">
+              <a:lnSpc>
+                <a:spcPct val="90000"/>
+              </a:lnSpc>
+              <a:spcBef>
+                <a:spcPts val="1000"/>
+              </a:spcBef>
+              <a:buFont typeface="Arial" panose="020B0604020202020204" pitchFamily="34" charset="0"/>
+              <a:buNone/>
+              <a:defRPr sz="2400" kern="1200">
+                <a:solidFill>
+                  <a:schemeClr val="tx1"/>
+                </a:solidFill>
+                <a:latin typeface="+mn-lt"/>
+                <a:ea typeface="+mn-ea"/>
+                <a:cs typeface="+mn-cs"/>
+              </a:defRPr>
+            </a:lvl1pPr>
+            <a:lvl2pPr marL="457200" indent="0" algn="ctr" defTabSz="914400" rtl="0" eaLnBrk="1" latinLnBrk="1" hangingPunct="1">
+              <a:lnSpc>
+                <a:spcPct val="90000"/>
+              </a:lnSpc>
+              <a:spcBef>
+                <a:spcPts val="500"/>
+              </a:spcBef>
+              <a:buFont typeface="Arial" panose="020B0604020202020204" pitchFamily="34" charset="0"/>
+              <a:buNone/>
+              <a:defRPr sz="2000" kern="1200">
+                <a:solidFill>
+                  <a:schemeClr val="tx1"/>
+                </a:solidFill>
+                <a:latin typeface="+mn-lt"/>
+                <a:ea typeface="+mn-ea"/>
+                <a:cs typeface="+mn-cs"/>
+              </a:defRPr>
+            </a:lvl2pPr>
+            <a:lvl3pPr marL="914400" indent="0" algn="ctr" defTabSz="914400" rtl="0" eaLnBrk="1" latinLnBrk="1" hangingPunct="1">
+              <a:lnSpc>
+                <a:spcPct val="90000"/>
+              </a:lnSpc>
+              <a:spcBef>
+                <a:spcPts val="500"/>
+              </a:spcBef>
+              <a:buFont typeface="Arial" panose="020B0604020202020204" pitchFamily="34" charset="0"/>
+              <a:buNone/>
+              <a:defRPr sz="1800" kern="1200">
+                <a:solidFill>
+                  <a:schemeClr val="tx1"/>
+                </a:solidFill>
+                <a:latin typeface="+mn-lt"/>
+                <a:ea typeface="+mn-ea"/>
+                <a:cs typeface="+mn-cs"/>
+              </a:defRPr>
+            </a:lvl3pPr>
+            <a:lvl4pPr marL="1371600" indent="0" algn="ctr" defTabSz="914400" rtl="0" eaLnBrk="1" latinLnBrk="1" hangingPunct="1">
+              <a:lnSpc>
+                <a:spcPct val="90000"/>
+              </a:lnSpc>
+              <a:spcBef>
+                <a:spcPts val="500"/>
+              </a:spcBef>
+              <a:buFont typeface="Arial" panose="020B0604020202020204" pitchFamily="34" charset="0"/>
+              <a:buNone/>
+              <a:defRPr sz="1600" kern="1200">
+                <a:solidFill>
+                  <a:schemeClr val="tx1"/>
+                </a:solidFill>
+                <a:latin typeface="+mn-lt"/>
+                <a:ea typeface="+mn-ea"/>
+                <a:cs typeface="+mn-cs"/>
+              </a:defRPr>
+            </a:lvl4pPr>
+            <a:lvl5pPr marL="1828800" indent="0" algn="ctr" defTabSz="914400" rtl="0" eaLnBrk="1" latinLnBrk="1" hangingPunct="1">
+              <a:lnSpc>
+                <a:spcPct val="90000"/>
+              </a:lnSpc>
+              <a:spcBef>
+                <a:spcPts val="500"/>
+              </a:spcBef>
+              <a:buFont typeface="Arial" panose="020B0604020202020204" pitchFamily="34" charset="0"/>
+              <a:buNone/>
+              <a:defRPr sz="1600" kern="1200">
+                <a:solidFill>
+                  <a:schemeClr val="tx1"/>
+                </a:solidFill>
+                <a:latin typeface="+mn-lt"/>
+                <a:ea typeface="+mn-ea"/>
+                <a:cs typeface="+mn-cs"/>
+              </a:defRPr>
+            </a:lvl5pPr>
+            <a:lvl6pPr marL="2286000" indent="0" algn="ctr" defTabSz="914400" rtl="0" eaLnBrk="1" latinLnBrk="1" hangingPunct="1">
+              <a:lnSpc>
+                <a:spcPct val="90000"/>
+              </a:lnSpc>
+              <a:spcBef>
+                <a:spcPts val="500"/>
+              </a:spcBef>
+              <a:buFont typeface="Arial" panose="020B0604020202020204" pitchFamily="34" charset="0"/>
+              <a:buNone/>
+              <a:defRPr sz="1600" kern="1200">
+                <a:solidFill>
+                  <a:schemeClr val="tx1"/>
+                </a:solidFill>
+                <a:latin typeface="+mn-lt"/>
+                <a:ea typeface="+mn-ea"/>
+                <a:cs typeface="+mn-cs"/>
+              </a:defRPr>
+            </a:lvl6pPr>
+            <a:lvl7pPr marL="2743200" indent="0" algn="ctr" defTabSz="914400" rtl="0" eaLnBrk="1" latinLnBrk="1" hangingPunct="1">
+              <a:lnSpc>
+                <a:spcPct val="90000"/>
+              </a:lnSpc>
+              <a:spcBef>
+                <a:spcPts val="500"/>
+              </a:spcBef>
+              <a:buFont typeface="Arial" panose="020B0604020202020204" pitchFamily="34" charset="0"/>
+              <a:buNone/>
+              <a:defRPr sz="1600" kern="1200">
+                <a:solidFill>
+                  <a:schemeClr val="tx1"/>
+                </a:solidFill>
+                <a:latin typeface="+mn-lt"/>
+                <a:ea typeface="+mn-ea"/>
+                <a:cs typeface="+mn-cs"/>
+              </a:defRPr>
+            </a:lvl7pPr>
+            <a:lvl8pPr marL="3200400" indent="0" algn="ctr" defTabSz="914400" rtl="0" eaLnBrk="1" latinLnBrk="1" hangingPunct="1">
+              <a:lnSpc>
+                <a:spcPct val="90000"/>
+              </a:lnSpc>
+              <a:spcBef>
+                <a:spcPts val="500"/>
+              </a:spcBef>
+              <a:buFont typeface="Arial" panose="020B0604020202020204" pitchFamily="34" charset="0"/>
+              <a:buNone/>
+              <a:defRPr sz="1600" kern="1200">
+                <a:solidFill>
+                  <a:schemeClr val="tx1"/>
+                </a:solidFill>
+                <a:latin typeface="+mn-lt"/>
+                <a:ea typeface="+mn-ea"/>
+                <a:cs typeface="+mn-cs"/>
+              </a:defRPr>
+            </a:lvl8pPr>
+            <a:lvl9pPr marL="3657600" indent="0" algn="ctr" defTabSz="914400" rtl="0" eaLnBrk="1" latinLnBrk="1" hangingPunct="1">
+              <a:lnSpc>
+                <a:spcPct val="90000"/>
+              </a:lnSpc>
+              <a:spcBef>
+                <a:spcPts val="500"/>
+              </a:spcBef>
+              <a:buFont typeface="Arial" panose="020B0604020202020204" pitchFamily="34" charset="0"/>
+              <a:buNone/>
+              <a:defRPr sz="1600" kern="1200">
+                <a:solidFill>
+                  <a:schemeClr val="tx1"/>
+                </a:solidFill>
+                <a:latin typeface="+mn-lt"/>
+                <a:ea typeface="+mn-ea"/>
+                <a:cs typeface="+mn-cs"/>
+              </a:defRPr>
+            </a:lvl9pPr>
+          </a:lstStyle>
+          <a:p>
+            <a:pPr>
+              <a:lnSpc>
+                <a:spcPct val="100000"/>
+              </a:lnSpc>
+            </a:pPr>
+            <a:r>
+              <a:rPr lang="ko-KR" altLang="en-US" sz="4400" dirty="0">
+                <a:solidFill>
+                  <a:schemeClr val="bg1">
+                    <a:lumMod val="95000"/>
+                  </a:schemeClr>
+                </a:solidFill>
+              </a:rPr>
+              <a:t>탐색 값이 담겨 있는 자료 구조가 </a:t>
+            </a:r>
+            <a:endParaRPr lang="en-US" altLang="ko-KR" sz="4400" dirty="0">
+              <a:solidFill>
+                <a:schemeClr val="bg1">
+                  <a:lumMod val="95000"/>
+                </a:schemeClr>
+              </a:solidFill>
+            </a:endParaRPr>
+          </a:p>
+          <a:p>
+            <a:pPr>
+              <a:lnSpc>
+                <a:spcPct val="100000"/>
+              </a:lnSpc>
+            </a:pPr>
+            <a:r>
+              <a:rPr lang="ko-KR" altLang="en-US" sz="4400" dirty="0">
+                <a:solidFill>
+                  <a:schemeClr val="bg1">
+                    <a:lumMod val="95000"/>
+                  </a:schemeClr>
+                </a:solidFill>
+              </a:rPr>
+              <a:t>임의 접근을 지원하여야 한다</a:t>
+            </a:r>
+            <a:endParaRPr lang="en-US" altLang="ko-KR" sz="4400" dirty="0">
+              <a:solidFill>
+                <a:schemeClr val="bg1">
+                  <a:lumMod val="95000"/>
+                </a:schemeClr>
+              </a:solidFill>
+            </a:endParaRPr>
+          </a:p>
+          <a:p>
+            <a:pPr>
+              <a:lnSpc>
+                <a:spcPct val="100000"/>
+              </a:lnSpc>
+            </a:pPr>
+            <a:endParaRPr lang="en-US" altLang="ko-KR" sz="3600" dirty="0">
+              <a:solidFill>
+                <a:schemeClr val="bg1">
+                  <a:lumMod val="95000"/>
+                </a:schemeClr>
+              </a:solidFill>
+            </a:endParaRPr>
+          </a:p>
+          <a:p>
+            <a:pPr>
+              <a:lnSpc>
+                <a:spcPct val="100000"/>
+              </a:lnSpc>
+            </a:pPr>
+            <a:r>
+              <a:rPr lang="en-US" altLang="ko-KR" sz="3600" dirty="0">
+                <a:solidFill>
+                  <a:schemeClr val="bg1">
+                    <a:lumMod val="95000"/>
+                  </a:schemeClr>
+                </a:solidFill>
+              </a:rPr>
+              <a:t>[ex]</a:t>
+            </a:r>
+          </a:p>
+          <a:p>
+            <a:pPr>
+              <a:lnSpc>
+                <a:spcPct val="100000"/>
+              </a:lnSpc>
+            </a:pPr>
+            <a:r>
+              <a:rPr lang="ko-KR" altLang="en-US" sz="3600" dirty="0">
+                <a:solidFill>
+                  <a:schemeClr val="accent6">
+                    <a:lumMod val="60000"/>
+                    <a:lumOff val="40000"/>
+                  </a:schemeClr>
+                </a:solidFill>
+              </a:rPr>
+              <a:t>배열</a:t>
+            </a:r>
+            <a:r>
+              <a:rPr lang="ko-KR" altLang="en-US" sz="3600" dirty="0">
+                <a:solidFill>
+                  <a:schemeClr val="bg1">
+                    <a:lumMod val="95000"/>
+                  </a:schemeClr>
+                </a:solidFill>
+              </a:rPr>
+              <a:t>😁 </a:t>
+            </a:r>
+            <a:endParaRPr lang="en-US" altLang="ko-KR" sz="3600" dirty="0">
+              <a:solidFill>
+                <a:schemeClr val="bg1">
+                  <a:lumMod val="95000"/>
+                </a:schemeClr>
+              </a:solidFill>
+            </a:endParaRPr>
+          </a:p>
+          <a:p>
+            <a:pPr>
+              <a:lnSpc>
+                <a:spcPct val="100000"/>
+              </a:lnSpc>
+            </a:pPr>
+            <a:r>
+              <a:rPr lang="en-US" altLang="ko-KR" sz="3600" dirty="0">
+                <a:solidFill>
+                  <a:schemeClr val="accent2">
+                    <a:lumMod val="60000"/>
+                    <a:lumOff val="40000"/>
+                  </a:schemeClr>
+                </a:solidFill>
+              </a:rPr>
+              <a:t>Linked list</a:t>
+            </a:r>
+            <a:r>
+              <a:rPr lang="ko-KR" altLang="en-US" sz="3600" dirty="0">
+                <a:solidFill>
+                  <a:schemeClr val="bg1">
+                    <a:lumMod val="95000"/>
+                  </a:schemeClr>
+                </a:solidFill>
+              </a:rPr>
+              <a:t>😩</a:t>
+            </a:r>
+            <a:endParaRPr lang="en-US" altLang="ko-KR" sz="3600" dirty="0">
+              <a:solidFill>
+                <a:schemeClr val="bg1">
+                  <a:lumMod val="95000"/>
+                </a:schemeClr>
+              </a:solidFill>
+            </a:endParaRPr>
+          </a:p>
+        </p:txBody>
+      </p:sp>
     </p:spTree>
     <p:extLst>
       <p:ext uri="{BB962C8B-B14F-4D97-AF65-F5344CB8AC3E}">
-        <p14:creationId xmlns:p14="http://schemas.microsoft.com/office/powerpoint/2010/main" val="2659217874"/>
+        <p14:creationId xmlns:p14="http://schemas.microsoft.com/office/powerpoint/2010/main" val="2630646852"/>
       </p:ext>
     </p:extLst>
   </p:cSld>
@@ -6943,13 +7712,13 @@
         </p:nvSpPr>
         <p:spPr>
           <a:xfrm>
-            <a:off x="1524000" y="1399823"/>
-            <a:ext cx="9144000" cy="3714044"/>
+            <a:off x="1524000" y="1885245"/>
+            <a:ext cx="9144000" cy="2585155"/>
           </a:xfrm>
         </p:spPr>
         <p:txBody>
           <a:bodyPr>
-            <a:normAutofit fontScale="92500"/>
+            <a:normAutofit/>
           </a:bodyPr>
           <a:lstStyle/>
           <a:p>
@@ -6963,24 +7732,15 @@
           </a:p>
           <a:p>
             <a:r>
-              <a:rPr lang="ko-KR" altLang="en-US" sz="4300" dirty="0">
+              <a:rPr lang="ko-KR" altLang="en-US" sz="3600" dirty="0">
                 <a:solidFill>
                   <a:schemeClr val="bg1">
                     <a:lumMod val="95000"/>
                   </a:schemeClr>
                 </a:solidFill>
               </a:rPr>
-              <a:t>풀이 순서</a:t>
-            </a:r>
-            <a:endParaRPr lang="en-US" altLang="ko-KR" sz="4300" dirty="0">
-              <a:solidFill>
-                <a:schemeClr val="bg1">
-                  <a:lumMod val="95000"/>
-                </a:schemeClr>
-              </a:solidFill>
-            </a:endParaRPr>
-          </a:p>
-          <a:p>
+              <a:t>🌲나무 자르기</a:t>
+            </a:r>
             <a:endParaRPr lang="en-US" altLang="ko-KR" sz="3600" dirty="0">
               <a:solidFill>
                 <a:schemeClr val="bg1">
@@ -6990,84 +7750,6 @@
             </a:endParaRPr>
           </a:p>
           <a:p>
-            <a:pPr marL="742950" indent="-742950" algn="l">
-              <a:buAutoNum type="arabicPeriod"/>
-            </a:pPr>
-            <a:r>
-              <a:rPr lang="ko-KR" altLang="en-US" sz="3600" dirty="0">
-                <a:solidFill>
-                  <a:schemeClr val="bg1">
-                    <a:lumMod val="95000"/>
-                  </a:schemeClr>
-                </a:solidFill>
-              </a:rPr>
-              <a:t>초기 </a:t>
-            </a:r>
-            <a:r>
-              <a:rPr lang="en-US" altLang="ko-KR" sz="3600" dirty="0">
-                <a:solidFill>
-                  <a:schemeClr val="bg1">
-                    <a:lumMod val="95000"/>
-                  </a:schemeClr>
-                </a:solidFill>
-              </a:rPr>
-              <a:t>left=0, right=Max(</a:t>
-            </a:r>
-            <a:r>
-              <a:rPr lang="ko-KR" altLang="en-US" sz="3600" dirty="0">
-                <a:solidFill>
-                  <a:schemeClr val="bg1">
-                    <a:lumMod val="95000"/>
-                  </a:schemeClr>
-                </a:solidFill>
-              </a:rPr>
-              <a:t>나무크기</a:t>
-            </a:r>
-            <a:r>
-              <a:rPr lang="en-US" altLang="ko-KR" sz="3600" dirty="0">
-                <a:solidFill>
-                  <a:schemeClr val="bg1">
-                    <a:lumMod val="95000"/>
-                  </a:schemeClr>
-                </a:solidFill>
-              </a:rPr>
-              <a:t>)</a:t>
-            </a:r>
-          </a:p>
-          <a:p>
-            <a:pPr marL="742950" indent="-742950" algn="l">
-              <a:buAutoNum type="arabicPeriod"/>
-            </a:pPr>
-            <a:r>
-              <a:rPr lang="ko-KR" altLang="en-US" sz="3600" dirty="0">
-                <a:solidFill>
-                  <a:schemeClr val="bg1">
-                    <a:lumMod val="95000"/>
-                  </a:schemeClr>
-                </a:solidFill>
-              </a:rPr>
-              <a:t>이분 탐색을 통해 얻은 값을 </a:t>
-            </a:r>
-            <a:r>
-              <a:rPr lang="en-US" altLang="ko-KR" sz="3600" dirty="0">
-                <a:solidFill>
-                  <a:schemeClr val="bg1">
-                    <a:lumMod val="95000"/>
-                  </a:schemeClr>
-                </a:solidFill>
-              </a:rPr>
-              <a:t>M</a:t>
-            </a:r>
-            <a:r>
-              <a:rPr lang="ko-KR" altLang="en-US" sz="3600" dirty="0">
-                <a:solidFill>
-                  <a:schemeClr val="bg1">
-                    <a:lumMod val="95000"/>
-                  </a:schemeClr>
-                </a:solidFill>
-              </a:rPr>
-              <a:t>과 비교</a:t>
-            </a:r>
             <a:endParaRPr lang="en-US" altLang="ko-KR" sz="3600" dirty="0">
               <a:solidFill>
                 <a:schemeClr val="bg1">
@@ -7077,9 +7759,6 @@
             </a:endParaRPr>
           </a:p>
           <a:p>
-            <a:pPr marL="742950" indent="-742950" algn="l">
-              <a:buAutoNum type="arabicPeriod"/>
-            </a:pPr>
             <a:r>
               <a:rPr lang="en-US" altLang="ko-KR" sz="3600" dirty="0">
                 <a:solidFill>
@@ -7088,45 +7767,8 @@
                   </a:schemeClr>
                 </a:solidFill>
               </a:rPr>
-              <a:t>M</a:t>
-            </a:r>
-            <a:r>
-              <a:rPr lang="ko-KR" altLang="en-US" sz="3600" dirty="0">
-                <a:solidFill>
-                  <a:schemeClr val="bg1">
-                    <a:lumMod val="95000"/>
-                  </a:schemeClr>
-                </a:solidFill>
-              </a:rPr>
-              <a:t>보다 크면 작은 값을</a:t>
-            </a:r>
-            <a:r>
-              <a:rPr lang="en-US" altLang="ko-KR" sz="3600" dirty="0">
-                <a:solidFill>
-                  <a:schemeClr val="bg1">
-                    <a:lumMod val="95000"/>
-                  </a:schemeClr>
-                </a:solidFill>
-              </a:rPr>
-              <a:t>, </a:t>
-            </a:r>
-            <a:r>
-              <a:rPr lang="ko-KR" altLang="en-US" sz="3600" dirty="0">
-                <a:solidFill>
-                  <a:schemeClr val="bg1">
-                    <a:lumMod val="95000"/>
-                  </a:schemeClr>
-                </a:solidFill>
-              </a:rPr>
-              <a:t>작으면 큰 값을 탐색</a:t>
-            </a:r>
-            <a:endParaRPr lang="en-US" altLang="ko-KR" sz="3600" dirty="0">
-              <a:solidFill>
-                <a:schemeClr val="bg1">
-                  <a:lumMod val="95000"/>
-                </a:schemeClr>
-              </a:solidFill>
-            </a:endParaRPr>
+              <a:t>https://www.acmicpc.net/problem/2805</a:t>
+            </a:r>
           </a:p>
         </p:txBody>
       </p:sp>
@@ -7356,7 +7998,7 @@
     </p:spTree>
     <p:extLst>
       <p:ext uri="{BB962C8B-B14F-4D97-AF65-F5344CB8AC3E}">
-        <p14:creationId xmlns:p14="http://schemas.microsoft.com/office/powerpoint/2010/main" val="120812618"/>
+        <p14:creationId xmlns:p14="http://schemas.microsoft.com/office/powerpoint/2010/main" val="2659217874"/>
       </p:ext>
     </p:extLst>
   </p:cSld>
@@ -7418,7 +8060,7 @@
         </p:spPr>
         <p:txBody>
           <a:bodyPr>
-            <a:normAutofit/>
+            <a:normAutofit fontScale="92500"/>
           </a:bodyPr>
           <a:lstStyle/>
           <a:p>
@@ -7439,7 +8081,7 @@
                   </a:schemeClr>
                 </a:solidFill>
               </a:rPr>
-              <a:t>이분 탐색을 사용한 이유</a:t>
+              <a:t>풀이 순서</a:t>
             </a:r>
             <a:endParaRPr lang="en-US" altLang="ko-KR" sz="4300" dirty="0">
               <a:solidFill>
@@ -7470,7 +8112,72 @@
                   </a:schemeClr>
                 </a:solidFill>
               </a:rPr>
-              <a:t>탐색 범위가 큼</a:t>
+              <a:t>초기 </a:t>
+            </a:r>
+            <a:r>
+              <a:rPr lang="en-US" altLang="ko-KR" sz="3600" dirty="0">
+                <a:solidFill>
+                  <a:schemeClr val="bg1">
+                    <a:lumMod val="95000"/>
+                  </a:schemeClr>
+                </a:solidFill>
+              </a:rPr>
+              <a:t>left=0, right=Max(</a:t>
+            </a:r>
+            <a:r>
+              <a:rPr lang="ko-KR" altLang="en-US" sz="3600" dirty="0">
+                <a:solidFill>
+                  <a:schemeClr val="bg1">
+                    <a:lumMod val="95000"/>
+                  </a:schemeClr>
+                </a:solidFill>
+              </a:rPr>
+              <a:t>나무크기</a:t>
+            </a:r>
+            <a:r>
+              <a:rPr lang="en-US" altLang="ko-KR" sz="3600" dirty="0">
+                <a:solidFill>
+                  <a:schemeClr val="bg1">
+                    <a:lumMod val="95000"/>
+                  </a:schemeClr>
+                </a:solidFill>
+              </a:rPr>
+              <a:t>)</a:t>
+            </a:r>
+          </a:p>
+          <a:p>
+            <a:pPr marL="742950" indent="-742950" algn="l">
+              <a:buAutoNum type="arabicPeriod"/>
+            </a:pPr>
+            <a:r>
+              <a:rPr lang="ko-KR" altLang="en-US" sz="3600" dirty="0">
+                <a:solidFill>
+                  <a:schemeClr val="bg1">
+                    <a:lumMod val="95000"/>
+                  </a:schemeClr>
+                </a:solidFill>
+              </a:rPr>
+              <a:t>이분 탐색을 통해 얻은 값을 </a:t>
+            </a:r>
+            <a:r>
+              <a:rPr lang="en-US" altLang="ko-KR" sz="3600" dirty="0">
+                <a:solidFill>
+                  <a:schemeClr val="bg1">
+                    <a:lumMod val="95000"/>
+                  </a:schemeClr>
+                </a:solidFill>
+              </a:rPr>
+              <a:t>M</a:t>
+            </a:r>
+            <a:r>
+              <a:rPr lang="ko-KR" altLang="en-US" sz="3600" dirty="0">
+                <a:solidFill>
+                  <a:schemeClr val="bg1">
+                    <a:lumMod val="95000"/>
+                  </a:schemeClr>
+                </a:solidFill>
+              </a:rPr>
+              <a:t>과 비교</a:t>
             </a:r>
             <a:endParaRPr lang="en-US" altLang="ko-KR" sz="3600" dirty="0">
               <a:solidFill>
@@ -7485,14 +8192,44 @@
               <a:buAutoNum type="arabicPeriod"/>
             </a:pPr>
             <a:r>
-              <a:rPr lang="ko-KR" altLang="en-US" sz="3600" dirty="0">
+              <a:rPr lang="en-US" altLang="ko-KR" sz="3600" dirty="0">
                 <a:solidFill>
                   <a:schemeClr val="bg1">
                     <a:lumMod val="95000"/>
                   </a:schemeClr>
                 </a:solidFill>
               </a:rPr>
-              <a:t>찾고자 하는 값이 정렬되어 있음</a:t>
+              <a:t>M</a:t>
+            </a:r>
+            <a:r>
+              <a:rPr lang="ko-KR" altLang="en-US" sz="3600" dirty="0">
+                <a:solidFill>
+                  <a:schemeClr val="bg1">
+                    <a:lumMod val="95000"/>
+                  </a:schemeClr>
+                </a:solidFill>
+              </a:rPr>
+              <a:t>보다 크면 작은 값을</a:t>
+            </a:r>
+            <a:r>
+              <a:rPr lang="en-US" altLang="ko-KR" sz="3600" dirty="0">
+                <a:solidFill>
+                  <a:schemeClr val="bg1">
+                    <a:lumMod val="95000"/>
+                  </a:schemeClr>
+                </a:solidFill>
+              </a:rPr>
+              <a:t>, </a:t>
+            </a:r>
+            <a:r>
+              <a:rPr lang="ko-KR" altLang="en-US" sz="3600" dirty="0">
+                <a:solidFill>
+                  <a:schemeClr val="bg1">
+                    <a:lumMod val="95000"/>
+                  </a:schemeClr>
+                </a:solidFill>
+              </a:rPr>
+              <a:t>작으면 큰 값을 탐색</a:t>
             </a:r>
             <a:endParaRPr lang="en-US" altLang="ko-KR" sz="3600" dirty="0">
               <a:solidFill>
@@ -7730,7 +8467,7 @@
     </p:spTree>
     <p:extLst>
       <p:ext uri="{BB962C8B-B14F-4D97-AF65-F5344CB8AC3E}">
-        <p14:creationId xmlns:p14="http://schemas.microsoft.com/office/powerpoint/2010/main" val="4040610195"/>
+        <p14:creationId xmlns:p14="http://schemas.microsoft.com/office/powerpoint/2010/main" val="120812618"/>
       </p:ext>
     </p:extLst>
   </p:cSld>

</xml_diff>